<commit_message>
- add photo knowledge
- photo
maybe buy 58mm f/1.4 nikon
or maybe buy 85mm f/1.4 nikon
</commit_message>
<xml_diff>
--- a/[BeAPhotographer].pptx
+++ b/[BeAPhotographer].pptx
@@ -304,7 +304,7 @@
           <a:p>
             <a:fld id="{E90ED720-0104-4369-84BC-D37694168613}" type="datetimeFigureOut">
               <a:rPr kumimoji="1" lang="ja-JP" altLang="en-US" smtClean="0"/>
-              <a:t>2018/9/9</a:t>
+              <a:t>2018/9/10</a:t>
             </a:fld>
             <a:endParaRPr kumimoji="1" lang="ja-JP" altLang="en-US"/>
           </a:p>
@@ -499,7 +499,7 @@
           <a:p>
             <a:fld id="{E90ED720-0104-4369-84BC-D37694168613}" type="datetimeFigureOut">
               <a:rPr kumimoji="1" lang="ja-JP" altLang="en-US" smtClean="0"/>
-              <a:t>2018/9/9</a:t>
+              <a:t>2018/9/10</a:t>
             </a:fld>
             <a:endParaRPr kumimoji="1" lang="ja-JP" altLang="en-US"/>
           </a:p>
@@ -704,7 +704,7 @@
           <a:p>
             <a:fld id="{E90ED720-0104-4369-84BC-D37694168613}" type="datetimeFigureOut">
               <a:rPr kumimoji="1" lang="ja-JP" altLang="en-US" smtClean="0"/>
-              <a:t>2018/9/9</a:t>
+              <a:t>2018/9/10</a:t>
             </a:fld>
             <a:endParaRPr kumimoji="1" lang="ja-JP" altLang="en-US"/>
           </a:p>
@@ -899,7 +899,7 @@
           <a:p>
             <a:fld id="{E90ED720-0104-4369-84BC-D37694168613}" type="datetimeFigureOut">
               <a:rPr kumimoji="1" lang="ja-JP" altLang="en-US" smtClean="0"/>
-              <a:t>2018/9/9</a:t>
+              <a:t>2018/9/10</a:t>
             </a:fld>
             <a:endParaRPr kumimoji="1" lang="ja-JP" altLang="en-US"/>
           </a:p>
@@ -1139,7 +1139,7 @@
           <a:p>
             <a:fld id="{E90ED720-0104-4369-84BC-D37694168613}" type="datetimeFigureOut">
               <a:rPr kumimoji="1" lang="ja-JP" altLang="en-US" smtClean="0"/>
-              <a:t>2018/9/9</a:t>
+              <a:t>2018/9/10</a:t>
             </a:fld>
             <a:endParaRPr kumimoji="1" lang="ja-JP" altLang="en-US"/>
           </a:p>
@@ -1483,7 +1483,7 @@
           <a:p>
             <a:fld id="{E90ED720-0104-4369-84BC-D37694168613}" type="datetimeFigureOut">
               <a:rPr kumimoji="1" lang="ja-JP" altLang="en-US" smtClean="0"/>
-              <a:t>2018/9/9</a:t>
+              <a:t>2018/9/10</a:t>
             </a:fld>
             <a:endParaRPr kumimoji="1" lang="ja-JP" altLang="en-US"/>
           </a:p>
@@ -1961,7 +1961,7 @@
           <a:p>
             <a:fld id="{E90ED720-0104-4369-84BC-D37694168613}" type="datetimeFigureOut">
               <a:rPr kumimoji="1" lang="ja-JP" altLang="en-US" smtClean="0"/>
-              <a:t>2018/9/9</a:t>
+              <a:t>2018/9/10</a:t>
             </a:fld>
             <a:endParaRPr kumimoji="1" lang="ja-JP" altLang="en-US"/>
           </a:p>
@@ -2073,7 +2073,7 @@
           <a:p>
             <a:fld id="{E90ED720-0104-4369-84BC-D37694168613}" type="datetimeFigureOut">
               <a:rPr kumimoji="1" lang="ja-JP" altLang="en-US" smtClean="0"/>
-              <a:t>2018/9/9</a:t>
+              <a:t>2018/9/10</a:t>
             </a:fld>
             <a:endParaRPr kumimoji="1" lang="ja-JP" altLang="en-US"/>
           </a:p>
@@ -2163,7 +2163,7 @@
           <a:p>
             <a:fld id="{E90ED720-0104-4369-84BC-D37694168613}" type="datetimeFigureOut">
               <a:rPr kumimoji="1" lang="ja-JP" altLang="en-US" smtClean="0"/>
-              <a:t>2018/9/9</a:t>
+              <a:t>2018/9/10</a:t>
             </a:fld>
             <a:endParaRPr kumimoji="1" lang="ja-JP" altLang="en-US"/>
           </a:p>
@@ -2465,7 +2465,7 @@
           <a:p>
             <a:fld id="{E90ED720-0104-4369-84BC-D37694168613}" type="datetimeFigureOut">
               <a:rPr kumimoji="1" lang="ja-JP" altLang="en-US" smtClean="0"/>
-              <a:t>2018/9/9</a:t>
+              <a:t>2018/9/10</a:t>
             </a:fld>
             <a:endParaRPr kumimoji="1" lang="ja-JP" altLang="en-US"/>
           </a:p>
@@ -2712,7 +2712,7 @@
           <a:p>
             <a:fld id="{E90ED720-0104-4369-84BC-D37694168613}" type="datetimeFigureOut">
               <a:rPr kumimoji="1" lang="ja-JP" altLang="en-US" smtClean="0"/>
-              <a:t>2018/9/9</a:t>
+              <a:t>2018/9/10</a:t>
             </a:fld>
             <a:endParaRPr kumimoji="1" lang="ja-JP" altLang="en-US"/>
           </a:p>
@@ -2950,7 +2950,7 @@
           <a:p>
             <a:fld id="{E90ED720-0104-4369-84BC-D37694168613}" type="datetimeFigureOut">
               <a:rPr kumimoji="1" lang="ja-JP" altLang="en-US" smtClean="0"/>
-              <a:t>2018/9/9</a:t>
+              <a:t>2018/9/10</a:t>
             </a:fld>
             <a:endParaRPr kumimoji="1" lang="ja-JP" altLang="en-US"/>
           </a:p>
@@ -4005,6 +4005,270 @@
           </a:prstGeom>
         </p:spPr>
       </p:pic>
+      <p:sp>
+        <p:nvSpPr>
+          <p:cNvPr id="5" name="テキスト ボックス 1">
+            <a:extLst>
+              <a:ext uri="{FF2B5EF4-FFF2-40B4-BE49-F238E27FC236}">
+                <a16:creationId xmlns:a16="http://schemas.microsoft.com/office/drawing/2014/main" id="{462D6A57-2568-45DA-B857-7D4B0A430CEC}"/>
+              </a:ext>
+            </a:extLst>
+          </p:cNvPr>
+          <p:cNvSpPr txBox="1"/>
+          <p:nvPr/>
+        </p:nvSpPr>
+        <p:spPr>
+          <a:xfrm>
+            <a:off x="0" y="6084168"/>
+            <a:ext cx="6858000" cy="2585323"/>
+          </a:xfrm>
+          <a:prstGeom prst="rect">
+            <a:avLst/>
+          </a:prstGeom>
+          <a:noFill/>
+        </p:spPr>
+        <p:txBody>
+          <a:bodyPr wrap="square" rtlCol="0">
+            <a:spAutoFit/>
+          </a:bodyPr>
+          <a:lstStyle/>
+          <a:p>
+            <a:r>
+              <a:rPr lang="en-US" altLang="zh-CN" dirty="0"/>
+              <a:t>Lens</a:t>
+            </a:r>
+            <a:r>
+              <a:rPr lang="zh-CN" altLang="en-US" dirty="0"/>
+              <a:t>的各种参数怎么看：</a:t>
+            </a:r>
+            <a:endParaRPr lang="en-US" altLang="zh-CN" dirty="0"/>
+          </a:p>
+          <a:p>
+            <a:pPr marL="285750" indent="-285750">
+              <a:buFont typeface="Arial" panose="020B0604020202020204" pitchFamily="34" charset="0"/>
+              <a:buChar char="•"/>
+            </a:pPr>
+            <a:r>
+              <a:rPr lang="en-US" altLang="zh-CN" b="1" dirty="0">
+                <a:solidFill>
+                  <a:srgbClr val="FF0000"/>
+                </a:solidFill>
+              </a:rPr>
+              <a:t>AF-S</a:t>
+            </a:r>
+            <a:r>
+              <a:rPr lang="en-US" altLang="zh-CN" dirty="0"/>
+              <a:t>: auto focus single, </a:t>
+            </a:r>
+            <a:r>
+              <a:rPr lang="zh-CN" altLang="en-US" dirty="0"/>
+              <a:t>一般用来拍静止物体的</a:t>
+            </a:r>
+            <a:r>
+              <a:rPr lang="en-US" altLang="zh-CN" dirty="0"/>
+              <a:t>lens(e.g., </a:t>
+            </a:r>
+            <a:r>
+              <a:rPr lang="zh-CN" altLang="en-US" dirty="0"/>
+              <a:t>拍花，人的</a:t>
+            </a:r>
+            <a:r>
+              <a:rPr lang="en-US" altLang="zh-CN" dirty="0"/>
+              <a:t>portrait lens)</a:t>
+            </a:r>
+          </a:p>
+          <a:p>
+            <a:pPr marL="285750" indent="-285750">
+              <a:buFont typeface="Arial" panose="020B0604020202020204" pitchFamily="34" charset="0"/>
+              <a:buChar char="•"/>
+            </a:pPr>
+            <a:r>
+              <a:rPr lang="en-US" altLang="zh-CN" b="1" dirty="0">
+                <a:solidFill>
+                  <a:srgbClr val="FF0000"/>
+                </a:solidFill>
+              </a:rPr>
+              <a:t>AF-C</a:t>
+            </a:r>
+            <a:r>
+              <a:rPr lang="en-US" altLang="zh-CN" dirty="0"/>
+              <a:t>: auto focus continuous, </a:t>
+            </a:r>
+            <a:r>
+              <a:rPr lang="zh-CN" altLang="en-US" dirty="0"/>
+              <a:t>内部有</a:t>
+            </a:r>
+            <a:r>
+              <a:rPr lang="en-US" altLang="zh-CN" dirty="0"/>
+              <a:t>servo</a:t>
+            </a:r>
+            <a:r>
+              <a:rPr lang="zh-CN" altLang="en-US" dirty="0"/>
+              <a:t>，可以连续多次自动对焦，用来拍摄移动物体</a:t>
+            </a:r>
+            <a:r>
+              <a:rPr lang="en-US" altLang="zh-CN" dirty="0"/>
+              <a:t>(</a:t>
+            </a:r>
+            <a:r>
+              <a:rPr lang="zh-CN" altLang="en-US" dirty="0"/>
+              <a:t>比如说跑来跑去的狗</a:t>
+            </a:r>
+            <a:r>
+              <a:rPr lang="en-US" altLang="zh-CN" dirty="0"/>
+              <a:t>)</a:t>
+            </a:r>
+          </a:p>
+          <a:p>
+            <a:pPr marL="285750" indent="-285750">
+              <a:buFont typeface="Arial" panose="020B0604020202020204" pitchFamily="34" charset="0"/>
+              <a:buChar char="•"/>
+            </a:pPr>
+            <a:r>
+              <a:rPr lang="en-US" altLang="zh-CN" b="1" dirty="0">
+                <a:solidFill>
+                  <a:srgbClr val="FF0000"/>
+                </a:solidFill>
+              </a:rPr>
+              <a:t>FX</a:t>
+            </a:r>
+            <a:r>
+              <a:rPr lang="en-US" altLang="zh-CN" dirty="0"/>
+              <a:t>: full frame lens, </a:t>
+            </a:r>
+            <a:r>
+              <a:rPr lang="zh-CN" altLang="en-US" dirty="0"/>
+              <a:t>用来装在</a:t>
+            </a:r>
+            <a:r>
+              <a:rPr lang="en-US" altLang="zh-CN" dirty="0"/>
+              <a:t>sensor</a:t>
+            </a:r>
+            <a:r>
+              <a:rPr lang="zh-CN" altLang="en-US" dirty="0"/>
+              <a:t>是</a:t>
+            </a:r>
+            <a:r>
+              <a:rPr lang="en-US" altLang="zh-CN" dirty="0"/>
+              <a:t>36x24 mm</a:t>
+            </a:r>
+            <a:r>
+              <a:rPr lang="zh-CN" altLang="en-US" dirty="0"/>
+              <a:t>的相机上的</a:t>
+            </a:r>
+            <a:r>
+              <a:rPr lang="en-US" altLang="zh-CN" dirty="0"/>
+              <a:t>lens</a:t>
+            </a:r>
+            <a:endParaRPr lang="en-US" altLang="zh-CN" b="1" dirty="0">
+              <a:solidFill>
+                <a:srgbClr val="FF0000"/>
+              </a:solidFill>
+            </a:endParaRPr>
+          </a:p>
+          <a:p>
+            <a:pPr marL="285750" indent="-285750">
+              <a:buFont typeface="Arial" panose="020B0604020202020204" pitchFamily="34" charset="0"/>
+              <a:buChar char="•"/>
+            </a:pPr>
+            <a:r>
+              <a:rPr lang="en-US" altLang="zh-CN" b="1" dirty="0">
+                <a:solidFill>
+                  <a:srgbClr val="FF0000"/>
+                </a:solidFill>
+              </a:rPr>
+              <a:t>DX</a:t>
+            </a:r>
+            <a:r>
+              <a:rPr lang="en-US" altLang="zh-CN" dirty="0"/>
+              <a:t>:</a:t>
+            </a:r>
+            <a:r>
+              <a:rPr lang="zh-CN" altLang="en-US" dirty="0"/>
+              <a:t>用来装在</a:t>
+            </a:r>
+            <a:r>
+              <a:rPr lang="en-US" altLang="zh-CN" dirty="0"/>
+              <a:t>sensor</a:t>
+            </a:r>
+            <a:r>
+              <a:rPr lang="zh-CN" altLang="en-US" dirty="0"/>
+              <a:t>是</a:t>
+            </a:r>
+            <a:r>
+              <a:rPr lang="en-US" altLang="zh-CN" dirty="0"/>
+              <a:t>24x16 mm</a:t>
+            </a:r>
+            <a:r>
+              <a:rPr lang="zh-CN" altLang="en-US" dirty="0"/>
+              <a:t>的相机上的</a:t>
+            </a:r>
+            <a:r>
+              <a:rPr lang="en-US" altLang="zh-CN" dirty="0"/>
+              <a:t>lens</a:t>
+            </a:r>
+          </a:p>
+          <a:p>
+            <a:pPr marL="285750" indent="-285750">
+              <a:buFont typeface="Arial" panose="020B0604020202020204" pitchFamily="34" charset="0"/>
+              <a:buChar char="•"/>
+            </a:pPr>
+            <a:r>
+              <a:rPr lang="en-US" altLang="zh-CN" b="1" dirty="0">
+                <a:solidFill>
+                  <a:srgbClr val="FF0000"/>
+                </a:solidFill>
+              </a:rPr>
+              <a:t>Prime</a:t>
+            </a:r>
+            <a:r>
+              <a:rPr lang="en-US" altLang="zh-CN" dirty="0"/>
+              <a:t> vs. </a:t>
+            </a:r>
+            <a:r>
+              <a:rPr lang="en-US" altLang="zh-CN" b="1" dirty="0">
+                <a:solidFill>
+                  <a:srgbClr val="FF0000"/>
+                </a:solidFill>
+              </a:rPr>
+              <a:t>zoom</a:t>
+            </a:r>
+            <a:r>
+              <a:rPr lang="en-US" altLang="zh-CN" dirty="0"/>
+              <a:t> lens: prime lens</a:t>
+            </a:r>
+            <a:r>
+              <a:rPr lang="zh-CN" altLang="en-US" dirty="0"/>
+              <a:t>是不能</a:t>
+            </a:r>
+            <a:r>
+              <a:rPr lang="en-US" altLang="zh-CN" dirty="0"/>
+              <a:t>zoom</a:t>
+            </a:r>
+            <a:r>
+              <a:rPr lang="zh-CN" altLang="en-US" dirty="0"/>
+              <a:t>的顶焦距</a:t>
+            </a:r>
+            <a:r>
+              <a:rPr lang="en-US" altLang="zh-CN" dirty="0"/>
+              <a:t>lens</a:t>
+            </a:r>
+            <a:r>
+              <a:rPr lang="zh-CN" altLang="en-US" dirty="0"/>
+              <a:t>，</a:t>
+            </a:r>
+            <a:r>
+              <a:rPr lang="en-US" altLang="zh-CN" dirty="0"/>
+              <a:t>zoom lens</a:t>
+            </a:r>
+            <a:r>
+              <a:rPr lang="zh-CN" altLang="en-US" dirty="0"/>
+              <a:t>不解释</a:t>
+            </a:r>
+            <a:endParaRPr lang="en-US" altLang="zh-CN" dirty="0"/>
+          </a:p>
+        </p:txBody>
+      </p:sp>
     </p:spTree>
     <p:extLst>
       <p:ext uri="{BB962C8B-B14F-4D97-AF65-F5344CB8AC3E}">

</xml_diff>